<commit_message>
feat: add flush + privilege hierarchy into `ComandosDCL.pdf`
</commit_message>
<xml_diff>
--- a/Aula 06/ComandosDCL.pptx
+++ b/Aula 06/ComandosDCL.pptx
@@ -269,7 +269,7 @@
           <a:p>
             <a:fld id="{1C45F205-BC06-4923-AE40-F9637F79EC90}" type="datetimeFigureOut">
               <a:rPr lang="pt-BR" smtClean="0"/>
-              <a:t>10/02/2026</a:t>
+              <a:t>20/02/2026</a:t>
             </a:fld>
             <a:endParaRPr lang="pt-BR"/>
           </a:p>
@@ -467,7 +467,7 @@
           <a:p>
             <a:fld id="{1C45F205-BC06-4923-AE40-F9637F79EC90}" type="datetimeFigureOut">
               <a:rPr lang="pt-BR" smtClean="0"/>
-              <a:t>10/02/2026</a:t>
+              <a:t>20/02/2026</a:t>
             </a:fld>
             <a:endParaRPr lang="pt-BR"/>
           </a:p>
@@ -675,7 +675,7 @@
           <a:p>
             <a:fld id="{1C45F205-BC06-4923-AE40-F9637F79EC90}" type="datetimeFigureOut">
               <a:rPr lang="pt-BR" smtClean="0"/>
-              <a:t>10/02/2026</a:t>
+              <a:t>20/02/2026</a:t>
             </a:fld>
             <a:endParaRPr lang="pt-BR"/>
           </a:p>
@@ -873,7 +873,7 @@
           <a:p>
             <a:fld id="{1C45F205-BC06-4923-AE40-F9637F79EC90}" type="datetimeFigureOut">
               <a:rPr lang="pt-BR" smtClean="0"/>
-              <a:t>10/02/2026</a:t>
+              <a:t>20/02/2026</a:t>
             </a:fld>
             <a:endParaRPr lang="pt-BR"/>
           </a:p>
@@ -1148,7 +1148,7 @@
           <a:p>
             <a:fld id="{1C45F205-BC06-4923-AE40-F9637F79EC90}" type="datetimeFigureOut">
               <a:rPr lang="pt-BR" smtClean="0"/>
-              <a:t>10/02/2026</a:t>
+              <a:t>20/02/2026</a:t>
             </a:fld>
             <a:endParaRPr lang="pt-BR"/>
           </a:p>
@@ -1413,7 +1413,7 @@
           <a:p>
             <a:fld id="{1C45F205-BC06-4923-AE40-F9637F79EC90}" type="datetimeFigureOut">
               <a:rPr lang="pt-BR" smtClean="0"/>
-              <a:t>10/02/2026</a:t>
+              <a:t>20/02/2026</a:t>
             </a:fld>
             <a:endParaRPr lang="pt-BR"/>
           </a:p>
@@ -1825,7 +1825,7 @@
           <a:p>
             <a:fld id="{1C45F205-BC06-4923-AE40-F9637F79EC90}" type="datetimeFigureOut">
               <a:rPr lang="pt-BR" smtClean="0"/>
-              <a:t>10/02/2026</a:t>
+              <a:t>20/02/2026</a:t>
             </a:fld>
             <a:endParaRPr lang="pt-BR"/>
           </a:p>
@@ -1966,7 +1966,7 @@
           <a:p>
             <a:fld id="{1C45F205-BC06-4923-AE40-F9637F79EC90}" type="datetimeFigureOut">
               <a:rPr lang="pt-BR" smtClean="0"/>
-              <a:t>10/02/2026</a:t>
+              <a:t>20/02/2026</a:t>
             </a:fld>
             <a:endParaRPr lang="pt-BR"/>
           </a:p>
@@ -2079,7 +2079,7 @@
           <a:p>
             <a:fld id="{1C45F205-BC06-4923-AE40-F9637F79EC90}" type="datetimeFigureOut">
               <a:rPr lang="pt-BR" smtClean="0"/>
-              <a:t>10/02/2026</a:t>
+              <a:t>20/02/2026</a:t>
             </a:fld>
             <a:endParaRPr lang="pt-BR"/>
           </a:p>
@@ -2390,7 +2390,7 @@
           <a:p>
             <a:fld id="{1C45F205-BC06-4923-AE40-F9637F79EC90}" type="datetimeFigureOut">
               <a:rPr lang="pt-BR" smtClean="0"/>
-              <a:t>10/02/2026</a:t>
+              <a:t>20/02/2026</a:t>
             </a:fld>
             <a:endParaRPr lang="pt-BR"/>
           </a:p>
@@ -2678,7 +2678,7 @@
           <a:p>
             <a:fld id="{1C45F205-BC06-4923-AE40-F9637F79EC90}" type="datetimeFigureOut">
               <a:rPr lang="pt-BR" smtClean="0"/>
-              <a:t>10/02/2026</a:t>
+              <a:t>20/02/2026</a:t>
             </a:fld>
             <a:endParaRPr lang="pt-BR"/>
           </a:p>
@@ -2919,7 +2919,7 @@
           <a:p>
             <a:fld id="{1C45F205-BC06-4923-AE40-F9637F79EC90}" type="datetimeFigureOut">
               <a:rPr lang="pt-BR" smtClean="0"/>
-              <a:t>10/02/2026</a:t>
+              <a:t>20/02/2026</a:t>
             </a:fld>
             <a:endParaRPr lang="pt-BR"/>
           </a:p>
@@ -4723,7 +4723,7 @@
         <p:spPr>
           <a:xfrm>
             <a:off x="756138" y="1086650"/>
-            <a:ext cx="10955215" cy="707886"/>
+            <a:ext cx="10955215" cy="954107"/>
           </a:xfrm>
           <a:prstGeom prst="rect">
             <a:avLst/>
@@ -4738,66 +4738,70 @@
           <a:p>
             <a:pPr algn="ctr"/>
             <a:r>
-              <a:rPr lang="en-US" sz="2000" dirty="0"/>
-              <a:t>DCL (Data Control Language) é o conjunto de </a:t>
-            </a:r>
-            <a:r>
-              <a:rPr lang="en-US" sz="2000" dirty="0" err="1"/>
+              <a:rPr lang="en-US" sz="2800" u="sng" dirty="0"/>
+              <a:t>DCL (Data Control Language)</a:t>
+            </a:r>
+            <a:r>
+              <a:rPr lang="en-US" sz="2800" dirty="0"/>
+              <a:t> é o conjunto de </a:t>
+            </a:r>
+            <a:r>
+              <a:rPr lang="en-US" sz="2800" dirty="0" err="1"/>
               <a:t>comandos</a:t>
             </a:r>
             <a:r>
-              <a:rPr lang="en-US" sz="2000" dirty="0"/>
+              <a:rPr lang="en-US" sz="2800" dirty="0"/>
               <a:t> </a:t>
             </a:r>
             <a:r>
-              <a:rPr lang="en-US" sz="2000" dirty="0" err="1"/>
+              <a:rPr lang="en-US" sz="2800" dirty="0" err="1"/>
               <a:t>responsáveis</a:t>
             </a:r>
             <a:r>
-              <a:rPr lang="en-US" sz="2000" dirty="0"/>
+              <a:rPr lang="en-US" sz="2800" dirty="0"/>
               <a:t> </a:t>
             </a:r>
             <a:r>
-              <a:rPr lang="en-US" sz="2000" dirty="0" err="1"/>
+              <a:rPr lang="en-US" sz="2800" dirty="0" err="1"/>
               <a:t>por</a:t>
             </a:r>
             <a:r>
-              <a:rPr lang="en-US" sz="2000" dirty="0"/>
+              <a:rPr lang="en-US" sz="2800" dirty="0"/>
               <a:t> </a:t>
             </a:r>
             <a:r>
-              <a:rPr lang="en-US" sz="2000" dirty="0" err="1"/>
+              <a:rPr lang="en-US" sz="2800" dirty="0" err="1"/>
               <a:t>garantir</a:t>
             </a:r>
             <a:r>
-              <a:rPr lang="en-US" sz="2000" dirty="0"/>
+              <a:rPr lang="en-US" sz="2800" dirty="0"/>
               <a:t> o </a:t>
             </a:r>
             <a:r>
-              <a:rPr lang="en-US" sz="2000" dirty="0" err="1"/>
+              <a:rPr lang="en-US" sz="2800" dirty="0" err="1"/>
               <a:t>controle</a:t>
             </a:r>
             <a:r>
-              <a:rPr lang="en-US" sz="2000" dirty="0"/>
+              <a:rPr lang="en-US" sz="2800" dirty="0"/>
               <a:t> de </a:t>
             </a:r>
             <a:r>
-              <a:rPr lang="en-US" sz="2000" dirty="0" err="1"/>
+              <a:rPr lang="en-US" sz="2800" dirty="0" err="1"/>
               <a:t>acesso</a:t>
             </a:r>
             <a:r>
-              <a:rPr lang="en-US" sz="2000" dirty="0"/>
+              <a:rPr lang="en-US" sz="2800" dirty="0"/>
               <a:t> </a:t>
             </a:r>
             <a:r>
-              <a:rPr lang="en-US" sz="2000" dirty="0" err="1"/>
+              <a:rPr lang="en-US" sz="2800" dirty="0" err="1"/>
               <a:t>ao</a:t>
             </a:r>
             <a:r>
-              <a:rPr lang="en-US" sz="2000" dirty="0"/>
+              <a:rPr lang="en-US" sz="2800" dirty="0"/>
               <a:t> banco de dados </a:t>
             </a:r>
-            <a:endParaRPr lang="pt-BR" sz="2000" dirty="0"/>
+            <a:endParaRPr lang="pt-BR" sz="2800" dirty="0"/>
           </a:p>
         </p:txBody>
       </p:sp>
@@ -4816,7 +4820,7 @@
         <p:spPr>
           <a:xfrm>
             <a:off x="756138" y="2525774"/>
-            <a:ext cx="1890347" cy="1569660"/>
+            <a:ext cx="2039816" cy="2000548"/>
           </a:xfrm>
           <a:prstGeom prst="rect">
             <a:avLst/>
@@ -4830,7 +4834,7 @@
           <a:lstStyle/>
           <a:p>
             <a:r>
-              <a:rPr lang="en-US" sz="2400" dirty="0"/>
+              <a:rPr lang="en-US" sz="2800" dirty="0"/>
               <a:t>Comandos:</a:t>
             </a:r>
           </a:p>
@@ -4843,7 +4847,7 @@
               <a:buChar char="Ø"/>
             </a:pPr>
             <a:r>
-              <a:rPr lang="en-US" sz="2400" dirty="0"/>
+              <a:rPr lang="en-US" sz="3600" dirty="0"/>
               <a:t>GRANT</a:t>
             </a:r>
           </a:p>
@@ -4853,10 +4857,10 @@
               <a:buChar char="Ø"/>
             </a:pPr>
             <a:r>
-              <a:rPr lang="en-US" sz="2400" dirty="0"/>
+              <a:rPr lang="en-US" sz="3600" dirty="0"/>
               <a:t>REVOKE</a:t>
             </a:r>
-            <a:endParaRPr lang="pt-BR" sz="2400" dirty="0"/>
+            <a:endParaRPr lang="pt-BR" sz="3600" dirty="0"/>
           </a:p>
         </p:txBody>
       </p:sp>
@@ -5099,19 +5103,11 @@
             </a:r>
             <a:r>
               <a:rPr lang="en-US" sz="2000" dirty="0"/>
-              <a:t>. De modo </a:t>
-            </a:r>
-            <a:r>
-              <a:rPr lang="en-US" sz="2000" dirty="0" err="1"/>
-              <a:t>geral</a:t>
-            </a:r>
-            <a:r>
-              <a:rPr lang="en-US" sz="2000" dirty="0"/>
-              <a:t>, </a:t>
+              <a:t>. É</a:t>
             </a:r>
             <a:r>
               <a:rPr lang="en-US" sz="2000" b="1" dirty="0"/>
-              <a:t>é </a:t>
+              <a:t> </a:t>
             </a:r>
             <a:r>
               <a:rPr lang="en-US" sz="2000" b="1" dirty="0" err="1"/>

</xml_diff>

<commit_message>
`fix: duplicated commit resolved`
</commit_message>
<xml_diff>
--- a/Aula 06/ComandosDCL.pptx
+++ b/Aula 06/ComandosDCL.pptx
@@ -10,12 +10,13 @@
     <p:sldId id="258" r:id="rId4"/>
     <p:sldId id="264" r:id="rId5"/>
     <p:sldId id="265" r:id="rId6"/>
-    <p:sldId id="266" r:id="rId7"/>
-    <p:sldId id="267" r:id="rId8"/>
-    <p:sldId id="276" r:id="rId9"/>
-    <p:sldId id="277" r:id="rId10"/>
-    <p:sldId id="268" r:id="rId11"/>
-    <p:sldId id="275" r:id="rId12"/>
+    <p:sldId id="278" r:id="rId7"/>
+    <p:sldId id="266" r:id="rId8"/>
+    <p:sldId id="267" r:id="rId9"/>
+    <p:sldId id="276" r:id="rId10"/>
+    <p:sldId id="277" r:id="rId11"/>
+    <p:sldId id="268" r:id="rId12"/>
+    <p:sldId id="275" r:id="rId13"/>
   </p:sldIdLst>
   <p:sldSz cx="12192000" cy="6858000"/>
   <p:notesSz cx="6858000" cy="9144000"/>
@@ -3535,6 +3536,108 @@
         <p:cNvPr id="1" name="">
           <a:extLst>
             <a:ext uri="{FF2B5EF4-FFF2-40B4-BE49-F238E27FC236}">
+              <a16:creationId xmlns:a16="http://schemas.microsoft.com/office/drawing/2014/main" id="{7E5A10E2-91E7-2CA5-10D1-A503A44002E2}"/>
+            </a:ext>
+          </a:extLst>
+        </p:cNvPr>
+        <p:cNvGrpSpPr/>
+        <p:nvPr/>
+      </p:nvGrpSpPr>
+      <p:grpSpPr>
+        <a:xfrm>
+          <a:off x="0" y="0"/>
+          <a:ext cx="0" cy="0"/>
+          <a:chOff x="0" y="0"/>
+          <a:chExt cx="0" cy="0"/>
+        </a:xfrm>
+      </p:grpSpPr>
+      <p:pic>
+        <p:nvPicPr>
+          <p:cNvPr id="5" name="Imagem 4">
+            <a:extLst>
+              <a:ext uri="{FF2B5EF4-FFF2-40B4-BE49-F238E27FC236}">
+                <a16:creationId xmlns:a16="http://schemas.microsoft.com/office/drawing/2014/main" id="{7F8F9171-963C-9D10-213C-2AF85B59BCBB}"/>
+              </a:ext>
+            </a:extLst>
+          </p:cNvPr>
+          <p:cNvPicPr>
+            <a:picLocks noChangeAspect="1"/>
+          </p:cNvPicPr>
+          <p:nvPr/>
+        </p:nvPicPr>
+        <p:blipFill>
+          <a:blip r:embed="rId2">
+            <a:extLst>
+              <a:ext uri="{28A0092B-C50C-407E-A947-70E740481C1C}">
+                <a14:useLocalDpi xmlns:a14="http://schemas.microsoft.com/office/drawing/2010/main" val="0"/>
+              </a:ext>
+            </a:extLst>
+          </a:blip>
+          <a:stretch>
+            <a:fillRect/>
+          </a:stretch>
+        </p:blipFill>
+        <p:spPr>
+          <a:xfrm>
+            <a:off x="0" y="0"/>
+            <a:ext cx="12192000" cy="6858000"/>
+          </a:xfrm>
+          <a:prstGeom prst="rect">
+            <a:avLst/>
+          </a:prstGeom>
+        </p:spPr>
+      </p:pic>
+      <p:pic>
+        <p:nvPicPr>
+          <p:cNvPr id="3" name="Imagem 2" descr="Interface gráfica do usuário, Texto, Aplicativo, Email&#10;&#10;O conteúdo gerado por IA pode estar incorreto.">
+            <a:extLst>
+              <a:ext uri="{FF2B5EF4-FFF2-40B4-BE49-F238E27FC236}">
+                <a16:creationId xmlns:a16="http://schemas.microsoft.com/office/drawing/2014/main" id="{6928AEB7-DE03-15B3-9857-8AD37D13D9CD}"/>
+              </a:ext>
+            </a:extLst>
+          </p:cNvPr>
+          <p:cNvPicPr>
+            <a:picLocks noChangeAspect="1"/>
+          </p:cNvPicPr>
+          <p:nvPr/>
+        </p:nvPicPr>
+        <p:blipFill>
+          <a:blip r:embed="rId3"/>
+          <a:stretch>
+            <a:fillRect/>
+          </a:stretch>
+        </p:blipFill>
+        <p:spPr>
+          <a:xfrm>
+            <a:off x="1104203" y="647312"/>
+            <a:ext cx="9983593" cy="5563376"/>
+          </a:xfrm>
+          <a:prstGeom prst="rect">
+            <a:avLst/>
+          </a:prstGeom>
+        </p:spPr>
+      </p:pic>
+    </p:spTree>
+    <p:extLst>
+      <p:ext uri="{BB962C8B-B14F-4D97-AF65-F5344CB8AC3E}">
+        <p14:creationId xmlns:p14="http://schemas.microsoft.com/office/powerpoint/2010/main" val="49284742"/>
+      </p:ext>
+    </p:extLst>
+  </p:cSld>
+  <p:clrMapOvr>
+    <a:masterClrMapping/>
+  </p:clrMapOvr>
+</p:sld>
+</file>
+
+<file path=ppt/slides/slide11.xml><?xml version="1.0" encoding="utf-8"?>
+<p:sld xmlns:a="http://schemas.openxmlformats.org/drawingml/2006/main" xmlns:r="http://schemas.openxmlformats.org/officeDocument/2006/relationships" xmlns:p="http://schemas.openxmlformats.org/presentationml/2006/main">
+  <p:cSld>
+    <p:spTree>
+      <p:nvGrpSpPr>
+        <p:cNvPr id="1" name="">
+          <a:extLst>
+            <a:ext uri="{FF2B5EF4-FFF2-40B4-BE49-F238E27FC236}">
               <a16:creationId xmlns:a16="http://schemas.microsoft.com/office/drawing/2014/main" id="{51E5E472-551B-D9DD-2520-A32CBA4305B1}"/>
             </a:ext>
           </a:extLst>
@@ -3982,7 +4085,7 @@
 </p:sld>
 </file>
 
-<file path=ppt/slides/slide11.xml><?xml version="1.0" encoding="utf-8"?>
+<file path=ppt/slides/slide12.xml><?xml version="1.0" encoding="utf-8"?>
 <p:sld xmlns:a="http://schemas.openxmlformats.org/drawingml/2006/main" xmlns:r="http://schemas.openxmlformats.org/officeDocument/2006/relationships" xmlns:p="http://schemas.openxmlformats.org/presentationml/2006/main">
   <p:cSld>
     <p:spTree>
@@ -5310,6 +5413,392 @@
         <p:cNvPr id="1" name="">
           <a:extLst>
             <a:ext uri="{FF2B5EF4-FFF2-40B4-BE49-F238E27FC236}">
+              <a16:creationId xmlns:a16="http://schemas.microsoft.com/office/drawing/2014/main" id="{33305544-BA6B-0383-93FA-15FC76704DA2}"/>
+            </a:ext>
+          </a:extLst>
+        </p:cNvPr>
+        <p:cNvGrpSpPr/>
+        <p:nvPr/>
+      </p:nvGrpSpPr>
+      <p:grpSpPr>
+        <a:xfrm>
+          <a:off x="0" y="0"/>
+          <a:ext cx="0" cy="0"/>
+          <a:chOff x="0" y="0"/>
+          <a:chExt cx="0" cy="0"/>
+        </a:xfrm>
+      </p:grpSpPr>
+      <p:pic>
+        <p:nvPicPr>
+          <p:cNvPr id="5" name="Imagem 4">
+            <a:extLst>
+              <a:ext uri="{FF2B5EF4-FFF2-40B4-BE49-F238E27FC236}">
+                <a16:creationId xmlns:a16="http://schemas.microsoft.com/office/drawing/2014/main" id="{304D1D90-4EA9-855A-1056-D0C7D6924B52}"/>
+              </a:ext>
+            </a:extLst>
+          </p:cNvPr>
+          <p:cNvPicPr>
+            <a:picLocks noChangeAspect="1"/>
+          </p:cNvPicPr>
+          <p:nvPr/>
+        </p:nvPicPr>
+        <p:blipFill>
+          <a:blip r:embed="rId2">
+            <a:extLst>
+              <a:ext uri="{28A0092B-C50C-407E-A947-70E740481C1C}">
+                <a14:useLocalDpi xmlns:a14="http://schemas.microsoft.com/office/drawing/2010/main" val="0"/>
+              </a:ext>
+            </a:extLst>
+          </a:blip>
+          <a:stretch>
+            <a:fillRect/>
+          </a:stretch>
+        </p:blipFill>
+        <p:spPr>
+          <a:xfrm>
+            <a:off x="0" y="0"/>
+            <a:ext cx="12192000" cy="6858000"/>
+          </a:xfrm>
+          <a:prstGeom prst="rect">
+            <a:avLst/>
+          </a:prstGeom>
+        </p:spPr>
+      </p:pic>
+      <p:sp>
+        <p:nvSpPr>
+          <p:cNvPr id="2" name="CaixaDeTexto 1">
+            <a:extLst>
+              <a:ext uri="{FF2B5EF4-FFF2-40B4-BE49-F238E27FC236}">
+                <a16:creationId xmlns:a16="http://schemas.microsoft.com/office/drawing/2014/main" id="{F0A96E23-B8CB-E563-4803-281B03243143}"/>
+              </a:ext>
+            </a:extLst>
+          </p:cNvPr>
+          <p:cNvSpPr txBox="1"/>
+          <p:nvPr/>
+        </p:nvSpPr>
+        <p:spPr>
+          <a:xfrm>
+            <a:off x="3747171" y="211328"/>
+            <a:ext cx="4697657" cy="646331"/>
+          </a:xfrm>
+          <a:prstGeom prst="rect">
+            <a:avLst/>
+          </a:prstGeom>
+          <a:noFill/>
+        </p:spPr>
+        <p:txBody>
+          <a:bodyPr wrap="square" rtlCol="0">
+            <a:spAutoFit/>
+          </a:bodyPr>
+          <a:lstStyle/>
+          <a:p>
+            <a:r>
+              <a:rPr lang="en-US" sz="3600" dirty="0" err="1"/>
+              <a:t>Hierarquia</a:t>
+            </a:r>
+            <a:r>
+              <a:rPr lang="en-US" sz="3600" dirty="0"/>
+              <a:t> de </a:t>
+            </a:r>
+            <a:r>
+              <a:rPr lang="en-US" sz="3600" dirty="0" err="1"/>
+              <a:t>Privilégios</a:t>
+            </a:r>
+            <a:endParaRPr lang="pt-BR" sz="3600" dirty="0"/>
+          </a:p>
+        </p:txBody>
+      </p:sp>
+      <p:sp>
+        <p:nvSpPr>
+          <p:cNvPr id="3" name="CaixaDeTexto 2">
+            <a:extLst>
+              <a:ext uri="{FF2B5EF4-FFF2-40B4-BE49-F238E27FC236}">
+                <a16:creationId xmlns:a16="http://schemas.microsoft.com/office/drawing/2014/main" id="{A69A6E76-8667-D92A-96E5-ECF6B707B003}"/>
+              </a:ext>
+            </a:extLst>
+          </p:cNvPr>
+          <p:cNvSpPr txBox="1"/>
+          <p:nvPr/>
+        </p:nvSpPr>
+        <p:spPr>
+          <a:xfrm>
+            <a:off x="756138" y="1086650"/>
+            <a:ext cx="10955215" cy="5447645"/>
+          </a:xfrm>
+          <a:prstGeom prst="rect">
+            <a:avLst/>
+          </a:prstGeom>
+          <a:noFill/>
+        </p:spPr>
+        <p:txBody>
+          <a:bodyPr wrap="square" rtlCol="0">
+            <a:spAutoFit/>
+          </a:bodyPr>
+          <a:lstStyle/>
+          <a:p>
+            <a:pPr algn="ctr"/>
+            <a:r>
+              <a:rPr lang="pt-BR" sz="3200" dirty="0"/>
+              <a:t>Os privilégios podem ser aplicados em diferentes níveis.</a:t>
+            </a:r>
+          </a:p>
+          <a:p>
+            <a:endParaRPr lang="en-US" sz="2800" dirty="0"/>
+          </a:p>
+          <a:p>
+            <a:r>
+              <a:rPr lang="en-US" sz="2800" dirty="0" err="1"/>
+              <a:t>Nível</a:t>
+            </a:r>
+            <a:r>
+              <a:rPr lang="en-US" sz="2800" dirty="0"/>
+              <a:t> Global: GRANT ALL ON *.* (Todo o </a:t>
+            </a:r>
+            <a:r>
+              <a:rPr lang="en-US" sz="2800" dirty="0" err="1"/>
+              <a:t>servidor</a:t>
+            </a:r>
+            <a:r>
+              <a:rPr lang="en-US" sz="2800" dirty="0"/>
+              <a:t>);</a:t>
+            </a:r>
+          </a:p>
+          <a:p>
+            <a:endParaRPr lang="en-US" sz="2800" dirty="0"/>
+          </a:p>
+          <a:p>
+            <a:r>
+              <a:rPr lang="en-US" sz="2800" dirty="0" err="1"/>
+              <a:t>Nível</a:t>
+            </a:r>
+            <a:r>
+              <a:rPr lang="en-US" sz="2800" dirty="0"/>
+              <a:t> Database: GRANT ALL ON </a:t>
+            </a:r>
+            <a:r>
+              <a:rPr lang="en-US" sz="2800" dirty="0" err="1"/>
+              <a:t>bd_exemplo</a:t>
+            </a:r>
+            <a:r>
+              <a:rPr lang="en-US" sz="2800" dirty="0"/>
+              <a:t>.*;</a:t>
+            </a:r>
+          </a:p>
+          <a:p>
+            <a:endParaRPr lang="en-US" sz="2800" dirty="0"/>
+          </a:p>
+          <a:p>
+            <a:r>
+              <a:rPr lang="en-US" sz="2800" dirty="0" err="1"/>
+              <a:t>Nível</a:t>
+            </a:r>
+            <a:r>
+              <a:rPr lang="en-US" sz="2800" dirty="0"/>
+              <a:t> de </a:t>
+            </a:r>
+            <a:r>
+              <a:rPr lang="en-US" sz="2800" dirty="0" err="1"/>
+              <a:t>Tabela</a:t>
+            </a:r>
+            <a:r>
+              <a:rPr lang="en-US" sz="2800" dirty="0"/>
+              <a:t>: GRANT SELECT ON </a:t>
+            </a:r>
+            <a:r>
+              <a:rPr lang="en-US" sz="2800" dirty="0" err="1"/>
+              <a:t>bd_exemplo.Musica</a:t>
+            </a:r>
+            <a:r>
+              <a:rPr lang="en-US" sz="2800" dirty="0"/>
+              <a:t>.</a:t>
+            </a:r>
+          </a:p>
+          <a:p>
+            <a:endParaRPr lang="en-US" sz="2800" dirty="0"/>
+          </a:p>
+          <a:p>
+            <a:pPr algn="ctr"/>
+            <a:r>
+              <a:rPr lang="en-US" sz="3600" dirty="0"/>
+              <a:t>FLUSH PRIVILEGES</a:t>
+            </a:r>
+          </a:p>
+          <a:p>
+            <a:pPr algn="ctr"/>
+            <a:endParaRPr lang="en-US" sz="2800" dirty="0"/>
+          </a:p>
+          <a:p>
+            <a:r>
+              <a:rPr lang="en-US" sz="2800" dirty="0"/>
+              <a:t>- </a:t>
+            </a:r>
+            <a:r>
+              <a:rPr lang="en-US" sz="2800" dirty="0" err="1"/>
+              <a:t>Atualiza</a:t>
+            </a:r>
+            <a:r>
+              <a:rPr lang="en-US" sz="2800" dirty="0"/>
+              <a:t> a </a:t>
+            </a:r>
+            <a:r>
+              <a:rPr lang="en-US" sz="2800" dirty="0" err="1"/>
+              <a:t>tabela</a:t>
+            </a:r>
+            <a:r>
+              <a:rPr lang="en-US" sz="2800" dirty="0"/>
+              <a:t> de </a:t>
+            </a:r>
+            <a:r>
+              <a:rPr lang="en-US" sz="2800" dirty="0" err="1"/>
+              <a:t>acessos</a:t>
+            </a:r>
+            <a:r>
+              <a:rPr lang="en-US" sz="2800" dirty="0"/>
+              <a:t> </a:t>
+            </a:r>
+            <a:r>
+              <a:rPr lang="en-US" sz="2800" dirty="0" err="1"/>
+              <a:t>imediatamente</a:t>
+            </a:r>
+            <a:r>
+              <a:rPr lang="en-US" sz="2800" dirty="0"/>
+              <a:t> </a:t>
+            </a:r>
+            <a:r>
+              <a:rPr lang="en-US" sz="2800" dirty="0" err="1"/>
+              <a:t>na</a:t>
+            </a:r>
+            <a:r>
+              <a:rPr lang="en-US" sz="2800" dirty="0"/>
+              <a:t> </a:t>
+            </a:r>
+            <a:r>
+              <a:rPr lang="en-US" sz="2800" dirty="0" err="1"/>
+              <a:t>memória</a:t>
+            </a:r>
+            <a:r>
+              <a:rPr lang="en-US" sz="2800" dirty="0"/>
+              <a:t>, </a:t>
+            </a:r>
+            <a:r>
+              <a:rPr lang="en-US" sz="2800" dirty="0" err="1"/>
+              <a:t>garantindo</a:t>
+            </a:r>
+            <a:r>
+              <a:rPr lang="en-US" sz="2800" dirty="0"/>
+              <a:t> </a:t>
+            </a:r>
+            <a:r>
+              <a:rPr lang="en-US" sz="2800" dirty="0" err="1"/>
+              <a:t>que</a:t>
+            </a:r>
+            <a:r>
+              <a:rPr lang="en-US" sz="2800" dirty="0"/>
+              <a:t> as </a:t>
+            </a:r>
+            <a:r>
+              <a:rPr lang="en-US" sz="2800" dirty="0" err="1"/>
+              <a:t>alterações</a:t>
+            </a:r>
+            <a:r>
+              <a:rPr lang="en-US" sz="2800" dirty="0"/>
+              <a:t> </a:t>
+            </a:r>
+            <a:r>
+              <a:rPr lang="en-US" sz="2800" dirty="0" err="1"/>
+              <a:t>entrem</a:t>
+            </a:r>
+            <a:r>
+              <a:rPr lang="en-US" sz="2800" dirty="0"/>
+              <a:t> </a:t>
+            </a:r>
+            <a:r>
+              <a:rPr lang="en-US" sz="2800" dirty="0" err="1"/>
+              <a:t>em</a:t>
+            </a:r>
+            <a:r>
+              <a:rPr lang="en-US" sz="2800" dirty="0"/>
+              <a:t> vigor </a:t>
+            </a:r>
+            <a:r>
+              <a:rPr lang="en-US" sz="2800" dirty="0" err="1"/>
+              <a:t>na</a:t>
+            </a:r>
+            <a:r>
+              <a:rPr lang="en-US" sz="2800" dirty="0"/>
+              <a:t> hora.</a:t>
+            </a:r>
+          </a:p>
+        </p:txBody>
+      </p:sp>
+      <p:pic>
+        <p:nvPicPr>
+          <p:cNvPr id="1028" name="Picture 4" descr="F5 button: 282 imagens, fotos e ilustrações stock livres de direitos |  Shutterstock">
+            <a:extLst>
+              <a:ext uri="{FF2B5EF4-FFF2-40B4-BE49-F238E27FC236}">
+                <a16:creationId xmlns:a16="http://schemas.microsoft.com/office/drawing/2014/main" id="{3098565D-67D3-5820-397B-98157A43715B}"/>
+              </a:ext>
+            </a:extLst>
+          </p:cNvPr>
+          <p:cNvPicPr>
+            <a:picLocks noChangeAspect="1" noChangeArrowheads="1"/>
+          </p:cNvPicPr>
+          <p:nvPr/>
+        </p:nvPicPr>
+        <p:blipFill>
+          <a:blip r:embed="rId3">
+            <a:extLst>
+              <a:ext uri="{28A0092B-C50C-407E-A947-70E740481C1C}">
+                <a14:useLocalDpi xmlns:a14="http://schemas.microsoft.com/office/drawing/2010/main" val="0"/>
+              </a:ext>
+            </a:extLst>
+          </a:blip>
+          <a:srcRect/>
+          <a:stretch>
+            <a:fillRect/>
+          </a:stretch>
+        </p:blipFill>
+        <p:spPr bwMode="auto">
+          <a:xfrm>
+            <a:off x="8005317" y="4460630"/>
+            <a:ext cx="879021" cy="946638"/>
+          </a:xfrm>
+          <a:prstGeom prst="rect">
+            <a:avLst/>
+          </a:prstGeom>
+          <a:noFill/>
+          <a:extLst>
+            <a:ext uri="{909E8E84-426E-40DD-AFC4-6F175D3DCCD1}">
+              <a14:hiddenFill xmlns:a14="http://schemas.microsoft.com/office/drawing/2010/main">
+                <a:solidFill>
+                  <a:srgbClr val="FFFFFF"/>
+                </a:solidFill>
+              </a14:hiddenFill>
+            </a:ext>
+          </a:extLst>
+        </p:spPr>
+      </p:pic>
+    </p:spTree>
+    <p:extLst>
+      <p:ext uri="{BB962C8B-B14F-4D97-AF65-F5344CB8AC3E}">
+        <p14:creationId xmlns:p14="http://schemas.microsoft.com/office/powerpoint/2010/main" val="1533308326"/>
+      </p:ext>
+    </p:extLst>
+  </p:cSld>
+  <p:clrMapOvr>
+    <a:masterClrMapping/>
+  </p:clrMapOvr>
+</p:sld>
+</file>
+
+<file path=ppt/slides/slide7.xml><?xml version="1.0" encoding="utf-8"?>
+<p:sld xmlns:a="http://schemas.openxmlformats.org/drawingml/2006/main" xmlns:r="http://schemas.openxmlformats.org/officeDocument/2006/relationships" xmlns:p="http://schemas.openxmlformats.org/presentationml/2006/main">
+  <p:cSld>
+    <p:spTree>
+      <p:nvGrpSpPr>
+        <p:cNvPr id="1" name="">
+          <a:extLst>
+            <a:ext uri="{FF2B5EF4-FFF2-40B4-BE49-F238E27FC236}">
               <a16:creationId xmlns:a16="http://schemas.microsoft.com/office/drawing/2014/main" id="{543228FC-2D67-9F9D-E3FE-7C0649C65DE8}"/>
             </a:ext>
           </a:extLst>
@@ -5583,7 +6072,7 @@
 </p:sld>
 </file>
 
-<file path=ppt/slides/slide7.xml><?xml version="1.0" encoding="utf-8"?>
+<file path=ppt/slides/slide8.xml><?xml version="1.0" encoding="utf-8"?>
 <p:sld xmlns:a="http://schemas.openxmlformats.org/drawingml/2006/main" xmlns:r="http://schemas.openxmlformats.org/officeDocument/2006/relationships" xmlns:p="http://schemas.openxmlformats.org/presentationml/2006/main">
   <p:cSld>
     <p:spTree>
@@ -5685,7 +6174,7 @@
 </p:sld>
 </file>
 
-<file path=ppt/slides/slide8.xml><?xml version="1.0" encoding="utf-8"?>
+<file path=ppt/slides/slide9.xml><?xml version="1.0" encoding="utf-8"?>
 <p:sld xmlns:a="http://schemas.openxmlformats.org/drawingml/2006/main" xmlns:r="http://schemas.openxmlformats.org/officeDocument/2006/relationships" xmlns:p="http://schemas.openxmlformats.org/presentationml/2006/main">
   <p:cSld>
     <p:spTree>
@@ -5994,108 +6483,6 @@
     <p:extLst>
       <p:ext uri="{BB962C8B-B14F-4D97-AF65-F5344CB8AC3E}">
         <p14:creationId xmlns:p14="http://schemas.microsoft.com/office/powerpoint/2010/main" val="2266546223"/>
-      </p:ext>
-    </p:extLst>
-  </p:cSld>
-  <p:clrMapOvr>
-    <a:masterClrMapping/>
-  </p:clrMapOvr>
-</p:sld>
-</file>
-
-<file path=ppt/slides/slide9.xml><?xml version="1.0" encoding="utf-8"?>
-<p:sld xmlns:a="http://schemas.openxmlformats.org/drawingml/2006/main" xmlns:r="http://schemas.openxmlformats.org/officeDocument/2006/relationships" xmlns:p="http://schemas.openxmlformats.org/presentationml/2006/main">
-  <p:cSld>
-    <p:spTree>
-      <p:nvGrpSpPr>
-        <p:cNvPr id="1" name="">
-          <a:extLst>
-            <a:ext uri="{FF2B5EF4-FFF2-40B4-BE49-F238E27FC236}">
-              <a16:creationId xmlns:a16="http://schemas.microsoft.com/office/drawing/2014/main" id="{7E5A10E2-91E7-2CA5-10D1-A503A44002E2}"/>
-            </a:ext>
-          </a:extLst>
-        </p:cNvPr>
-        <p:cNvGrpSpPr/>
-        <p:nvPr/>
-      </p:nvGrpSpPr>
-      <p:grpSpPr>
-        <a:xfrm>
-          <a:off x="0" y="0"/>
-          <a:ext cx="0" cy="0"/>
-          <a:chOff x="0" y="0"/>
-          <a:chExt cx="0" cy="0"/>
-        </a:xfrm>
-      </p:grpSpPr>
-      <p:pic>
-        <p:nvPicPr>
-          <p:cNvPr id="5" name="Imagem 4">
-            <a:extLst>
-              <a:ext uri="{FF2B5EF4-FFF2-40B4-BE49-F238E27FC236}">
-                <a16:creationId xmlns:a16="http://schemas.microsoft.com/office/drawing/2014/main" id="{7F8F9171-963C-9D10-213C-2AF85B59BCBB}"/>
-              </a:ext>
-            </a:extLst>
-          </p:cNvPr>
-          <p:cNvPicPr>
-            <a:picLocks noChangeAspect="1"/>
-          </p:cNvPicPr>
-          <p:nvPr/>
-        </p:nvPicPr>
-        <p:blipFill>
-          <a:blip r:embed="rId2">
-            <a:extLst>
-              <a:ext uri="{28A0092B-C50C-407E-A947-70E740481C1C}">
-                <a14:useLocalDpi xmlns:a14="http://schemas.microsoft.com/office/drawing/2010/main" val="0"/>
-              </a:ext>
-            </a:extLst>
-          </a:blip>
-          <a:stretch>
-            <a:fillRect/>
-          </a:stretch>
-        </p:blipFill>
-        <p:spPr>
-          <a:xfrm>
-            <a:off x="0" y="0"/>
-            <a:ext cx="12192000" cy="6858000"/>
-          </a:xfrm>
-          <a:prstGeom prst="rect">
-            <a:avLst/>
-          </a:prstGeom>
-        </p:spPr>
-      </p:pic>
-      <p:pic>
-        <p:nvPicPr>
-          <p:cNvPr id="3" name="Imagem 2" descr="Interface gráfica do usuário, Texto, Aplicativo, Email&#10;&#10;O conteúdo gerado por IA pode estar incorreto.">
-            <a:extLst>
-              <a:ext uri="{FF2B5EF4-FFF2-40B4-BE49-F238E27FC236}">
-                <a16:creationId xmlns:a16="http://schemas.microsoft.com/office/drawing/2014/main" id="{6928AEB7-DE03-15B3-9857-8AD37D13D9CD}"/>
-              </a:ext>
-            </a:extLst>
-          </p:cNvPr>
-          <p:cNvPicPr>
-            <a:picLocks noChangeAspect="1"/>
-          </p:cNvPicPr>
-          <p:nvPr/>
-        </p:nvPicPr>
-        <p:blipFill>
-          <a:blip r:embed="rId3"/>
-          <a:stretch>
-            <a:fillRect/>
-          </a:stretch>
-        </p:blipFill>
-        <p:spPr>
-          <a:xfrm>
-            <a:off x="1104203" y="647312"/>
-            <a:ext cx="9983593" cy="5563376"/>
-          </a:xfrm>
-          <a:prstGeom prst="rect">
-            <a:avLst/>
-          </a:prstGeom>
-        </p:spPr>
-      </p:pic>
-    </p:spTree>
-    <p:extLst>
-      <p:ext uri="{BB962C8B-B14F-4D97-AF65-F5344CB8AC3E}">
-        <p14:creationId xmlns:p14="http://schemas.microsoft.com/office/powerpoint/2010/main" val="49284742"/>
       </p:ext>
     </p:extLst>
   </p:cSld>

</xml_diff>